<commit_message>
Changed the description for the json data
</commit_message>
<xml_diff>
--- a/Eraneos_Analytics_DE_dropzone_challenge.pptx
+++ b/Eraneos_Analytics_DE_dropzone_challenge.pptx
@@ -215,6 +215,52 @@
             </pc226:cmChg>
           </p:ext>
         </pc:extLst>
+      </pc:sldChg>
+    </pc:docChg>
+  </pc:docChgLst>
+  <pc:docChgLst>
+    <pc:chgData name="Andrew Curran" userId="S::andrew.curran@eraneos.com::a3863812-7cd4-4576-bf46-b5bcf6048772" providerId="AD" clId="Web-{59EDA2CB-B4ED-700B-EDF6-AC957083C78C}"/>
+    <pc:docChg chg="modSld">
+      <pc:chgData name="Andrew Curran" userId="S::andrew.curran@eraneos.com::a3863812-7cd4-4576-bf46-b5bcf6048772" providerId="AD" clId="Web-{59EDA2CB-B4ED-700B-EDF6-AC957083C78C}" dt="2025-11-13T16:42:09.089" v="8" actId="20577"/>
+      <pc:docMkLst>
+        <pc:docMk/>
+      </pc:docMkLst>
+      <pc:sldChg chg="modSp">
+        <pc:chgData name="Andrew Curran" userId="S::andrew.curran@eraneos.com::a3863812-7cd4-4576-bf46-b5bcf6048772" providerId="AD" clId="Web-{59EDA2CB-B4ED-700B-EDF6-AC957083C78C}" dt="2025-11-13T16:42:09.089" v="8" actId="20577"/>
+        <pc:sldMkLst>
+          <pc:docMk/>
+          <pc:sldMk cId="1645354078" sldId="2147483638"/>
+        </pc:sldMkLst>
+        <pc:spChg chg="mod">
+          <ac:chgData name="Andrew Curran" userId="S::andrew.curran@eraneos.com::a3863812-7cd4-4576-bf46-b5bcf6048772" providerId="AD" clId="Web-{59EDA2CB-B4ED-700B-EDF6-AC957083C78C}" dt="2025-11-13T16:42:09.089" v="8" actId="20577"/>
+          <ac:spMkLst>
+            <pc:docMk/>
+            <pc:sldMk cId="1645354078" sldId="2147483638"/>
+            <ac:spMk id="2" creationId="{A2710E54-BDA1-E2C6-9DAC-6BD19C10D3FF}"/>
+          </ac:spMkLst>
+        </pc:spChg>
+      </pc:sldChg>
+      <pc:sldChg chg="mod modShow">
+        <pc:chgData name="Andrew Curran" userId="S::andrew.curran@eraneos.com::a3863812-7cd4-4576-bf46-b5bcf6048772" providerId="AD" clId="Web-{59EDA2CB-B4ED-700B-EDF6-AC957083C78C}" dt="2025-11-13T16:39:10.768" v="6"/>
+        <pc:sldMkLst>
+          <pc:docMk/>
+          <pc:sldMk cId="114453378" sldId="2147483641"/>
+        </pc:sldMkLst>
+      </pc:sldChg>
+      <pc:sldChg chg="modSp">
+        <pc:chgData name="Andrew Curran" userId="S::andrew.curran@eraneos.com::a3863812-7cd4-4576-bf46-b5bcf6048772" providerId="AD" clId="Web-{59EDA2CB-B4ED-700B-EDF6-AC957083C78C}" dt="2025-11-13T16:39:00.049" v="5" actId="20577"/>
+        <pc:sldMkLst>
+          <pc:docMk/>
+          <pc:sldMk cId="2665604951" sldId="2147483642"/>
+        </pc:sldMkLst>
+        <pc:spChg chg="mod">
+          <ac:chgData name="Andrew Curran" userId="S::andrew.curran@eraneos.com::a3863812-7cd4-4576-bf46-b5bcf6048772" providerId="AD" clId="Web-{59EDA2CB-B4ED-700B-EDF6-AC957083C78C}" dt="2025-11-13T16:39:00.049" v="5" actId="20577"/>
+          <ac:spMkLst>
+            <pc:docMk/>
+            <pc:sldMk cId="2665604951" sldId="2147483642"/>
+            <ac:spMk id="37" creationId="{D1B7D028-7BD8-31D7-6ED2-5298560D256F}"/>
+          </ac:spMkLst>
+        </pc:spChg>
       </pc:sldChg>
     </pc:docChg>
   </pc:docChgLst>
@@ -686,52 +732,6 @@
     </pc:docChg>
   </pc:docChgLst>
   <pc:docChgLst>
-    <pc:chgData name="Andrew Curran" userId="S::andrew.curran@eraneos.com::a3863812-7cd4-4576-bf46-b5bcf6048772" providerId="AD" clId="Web-{59EDA2CB-B4ED-700B-EDF6-AC957083C78C}"/>
-    <pc:docChg chg="modSld">
-      <pc:chgData name="Andrew Curran" userId="S::andrew.curran@eraneos.com::a3863812-7cd4-4576-bf46-b5bcf6048772" providerId="AD" clId="Web-{59EDA2CB-B4ED-700B-EDF6-AC957083C78C}" dt="2025-11-13T16:42:09.089" v="8" actId="20577"/>
-      <pc:docMkLst>
-        <pc:docMk/>
-      </pc:docMkLst>
-      <pc:sldChg chg="modSp">
-        <pc:chgData name="Andrew Curran" userId="S::andrew.curran@eraneos.com::a3863812-7cd4-4576-bf46-b5bcf6048772" providerId="AD" clId="Web-{59EDA2CB-B4ED-700B-EDF6-AC957083C78C}" dt="2025-11-13T16:42:09.089" v="8" actId="20577"/>
-        <pc:sldMkLst>
-          <pc:docMk/>
-          <pc:sldMk cId="1645354078" sldId="2147483638"/>
-        </pc:sldMkLst>
-        <pc:spChg chg="mod">
-          <ac:chgData name="Andrew Curran" userId="S::andrew.curran@eraneos.com::a3863812-7cd4-4576-bf46-b5bcf6048772" providerId="AD" clId="Web-{59EDA2CB-B4ED-700B-EDF6-AC957083C78C}" dt="2025-11-13T16:42:09.089" v="8" actId="20577"/>
-          <ac:spMkLst>
-            <pc:docMk/>
-            <pc:sldMk cId="1645354078" sldId="2147483638"/>
-            <ac:spMk id="2" creationId="{A2710E54-BDA1-E2C6-9DAC-6BD19C10D3FF}"/>
-          </ac:spMkLst>
-        </pc:spChg>
-      </pc:sldChg>
-      <pc:sldChg chg="mod modShow">
-        <pc:chgData name="Andrew Curran" userId="S::andrew.curran@eraneos.com::a3863812-7cd4-4576-bf46-b5bcf6048772" providerId="AD" clId="Web-{59EDA2CB-B4ED-700B-EDF6-AC957083C78C}" dt="2025-11-13T16:39:10.768" v="6"/>
-        <pc:sldMkLst>
-          <pc:docMk/>
-          <pc:sldMk cId="114453378" sldId="2147483641"/>
-        </pc:sldMkLst>
-      </pc:sldChg>
-      <pc:sldChg chg="modSp">
-        <pc:chgData name="Andrew Curran" userId="S::andrew.curran@eraneos.com::a3863812-7cd4-4576-bf46-b5bcf6048772" providerId="AD" clId="Web-{59EDA2CB-B4ED-700B-EDF6-AC957083C78C}" dt="2025-11-13T16:39:00.049" v="5" actId="20577"/>
-        <pc:sldMkLst>
-          <pc:docMk/>
-          <pc:sldMk cId="2665604951" sldId="2147483642"/>
-        </pc:sldMkLst>
-        <pc:spChg chg="mod">
-          <ac:chgData name="Andrew Curran" userId="S::andrew.curran@eraneos.com::a3863812-7cd4-4576-bf46-b5bcf6048772" providerId="AD" clId="Web-{59EDA2CB-B4ED-700B-EDF6-AC957083C78C}" dt="2025-11-13T16:39:00.049" v="5" actId="20577"/>
-          <ac:spMkLst>
-            <pc:docMk/>
-            <pc:sldMk cId="2665604951" sldId="2147483642"/>
-            <ac:spMk id="37" creationId="{D1B7D028-7BD8-31D7-6ED2-5298560D256F}"/>
-          </ac:spMkLst>
-        </pc:spChg>
-      </pc:sldChg>
-    </pc:docChg>
-  </pc:docChgLst>
-  <pc:docChgLst>
     <pc:chgData name="Andrew Curran" userId="S::andrew.curran@eraneos.com::a3863812-7cd4-4576-bf46-b5bcf6048772" providerId="AD" clId="Web-{4EF48214-E955-49D6-F60D-5B2393C42EF7}"/>
     <pc:docChg chg="modSld">
       <pc:chgData name="Andrew Curran" userId="S::andrew.curran@eraneos.com::a3863812-7cd4-4576-bf46-b5bcf6048772" providerId="AD" clId="Web-{4EF48214-E955-49D6-F60D-5B2393C42EF7}" dt="2025-10-28T08:13:33.412" v="195" actId="20577"/>
@@ -1169,7 +1169,7 @@
           <a:p>
             <a:fld id="{EEC665CA-D682-48EC-95D2-126FD6449D65}" type="datetime1">
               <a:rPr lang="de-CH" sz="900" smtClean="0"/>
-              <a:t>01.12.25</a:t>
+              <a:t>05.01.26</a:t>
             </a:fld>
             <a:endParaRPr lang="de-CH" sz="900"/>
           </a:p>
@@ -1470,7 +1470,7 @@
           <a:p>
             <a:fld id="{A17AAF7D-4283-4014-80F4-26E915FEACF8}" type="datetime1">
               <a:rPr lang="de-CH" smtClean="0"/>
-              <a:t>01.12.25</a:t>
+              <a:t>05.01.26</a:t>
             </a:fld>
             <a:endParaRPr lang="de-CH"/>
           </a:p>
@@ -12839,7 +12839,7 @@
               <a:rPr lang="en-US" dirty="0">
                 <a:latin typeface="Verdana Pro Light"/>
               </a:rPr>
-              <a:t>2025</a:t>
+              <a:t>2026</a:t>
             </a:r>
             <a:endParaRPr lang="en-US" dirty="0"/>
           </a:p>
@@ -13181,7 +13181,23 @@
                 <a:ea typeface="Verdana"/>
                 <a:cs typeface="Arial"/>
               </a:rPr>
-              <a:t>You will receive access to a sandbox in Google Cloud Platform or AWS as per your preference. You should get an email with the access link to the cloud to prepare the case.</a:t>
+              <a:t>You will receive access to a sandbox in Google Cloud Platform or AWS as per your preference. Additionally, you get an email with the access link to the cloud and </a:t>
+            </a:r>
+            <a:r>
+              <a:rPr lang="en-GB" sz="1100" dirty="0" err="1">
+                <a:latin typeface="Arial"/>
+                <a:ea typeface="Verdana"/>
+                <a:cs typeface="Arial"/>
+              </a:rPr>
+              <a:t>gitlab</a:t>
+            </a:r>
+            <a:r>
+              <a:rPr lang="en-GB" sz="1100" dirty="0">
+                <a:latin typeface="Arial"/>
+                <a:ea typeface="Verdana"/>
+                <a:cs typeface="Arial"/>
+              </a:rPr>
+              <a:t> repo to prepare the case.</a:t>
             </a:r>
             <a:br>
               <a:rPr lang="en-GB" sz="1100" dirty="0">
@@ -13513,7 +13529,7 @@
         <p:spPr>
           <a:xfrm>
             <a:off x="3931946" y="1780130"/>
-            <a:ext cx="3557158" cy="3939540"/>
+            <a:ext cx="3557158" cy="3785652"/>
           </a:xfrm>
           <a:prstGeom prst="rect">
             <a:avLst/>
@@ -13669,15 +13685,6 @@
             <a:endParaRPr lang="en-US" sz="1000" dirty="0">
               <a:cs typeface="Arial"/>
             </a:endParaRPr>
-          </a:p>
-          <a:p>
-            <a:pPr defTabSz="346100">
-              <a:lnSpc>
-                <a:spcPts val="1200"/>
-              </a:lnSpc>
-              <a:defRPr/>
-            </a:pPr>
-            <a:endParaRPr lang="en-US" sz="1000" dirty="0"/>
           </a:p>
         </p:txBody>
       </p:sp>
@@ -15780,7 +15787,7 @@
                   <a:uLnTx/>
                   <a:uFillTx/>
                 </a:rPr>
-                <a:t> | Prepare reference data</a:t>
+                <a:t> | Reference data</a:t>
               </a:r>
               <a:endParaRPr kumimoji="0" lang="en-US" sz="1050" b="1" i="0" u="none" strike="noStrike" kern="1200" cap="none" spc="0" normalizeH="0" baseline="0" noProof="0" dirty="0">
                 <a:ln>
@@ -15873,15 +15880,15 @@
               <a:pPr algn="l"/>
               <a:r>
                 <a:rPr lang="en-US" sz="1100" noProof="0" dirty="0"/>
-                <a:t>There are two csv files located in a GCS bucket. Make the </a:t>
+                <a:t>Check the </a:t>
               </a:r>
               <a:r>
                 <a:rPr lang="en-US" sz="1100" noProof="0" dirty="0" err="1"/>
-                <a:t>csvs</a:t>
+                <a:t>json</a:t>
               </a:r>
               <a:r>
                 <a:rPr lang="en-US" sz="1100" noProof="0" dirty="0"/>
-                <a:t> available through an OLAP DB. How would you enable your client to make updates to the reference data?</a:t>
+                <a:t>-data on the last slide of this deck. Consider it being measured data points that shall be ingested and stored to analyze them later on.</a:t>
               </a:r>
               <a:endParaRPr lang="en-US" sz="1300" noProof="0" dirty="0"/>
             </a:p>
@@ -15931,70 +15938,6 @@
           </p:style>
         </p:cxnSp>
       </p:grpSp>
-      <p:sp>
-        <p:nvSpPr>
-          <p:cNvPr id="33" name="Title 1">
-            <a:extLst>
-              <a:ext uri="{FF2B5EF4-FFF2-40B4-BE49-F238E27FC236}">
-                <a16:creationId xmlns:a16="http://schemas.microsoft.com/office/drawing/2014/main" id="{1019A5C3-4532-C2B9-2DC8-534879C4EAC1}"/>
-              </a:ext>
-            </a:extLst>
-          </p:cNvPr>
-          <p:cNvSpPr txBox="1">
-            <a:spLocks/>
-          </p:cNvSpPr>
-          <p:nvPr/>
-        </p:nvSpPr>
-        <p:spPr>
-          <a:xfrm>
-            <a:off x="2916777" y="222673"/>
-            <a:ext cx="6341064" cy="430887"/>
-          </a:xfrm>
-          <a:prstGeom prst="rect">
-            <a:avLst/>
-          </a:prstGeom>
-        </p:spPr>
-        <p:txBody>
-          <a:bodyPr vert="horz" wrap="square" lIns="0" tIns="0" rIns="0" bIns="0" rtlCol="0" anchor="t">
-            <a:spAutoFit/>
-          </a:bodyPr>
-          <a:lstStyle>
-            <a:lvl1pPr algn="l" defTabSz="914400" rtl="0" eaLnBrk="1" latinLnBrk="0" hangingPunct="1">
-              <a:lnSpc>
-                <a:spcPct val="90000"/>
-              </a:lnSpc>
-              <a:spcBef>
-                <a:spcPct val="0"/>
-              </a:spcBef>
-              <a:buNone/>
-              <a:defRPr sz="2800" kern="1200">
-                <a:solidFill>
-                  <a:schemeClr val="tx1"/>
-                </a:solidFill>
-                <a:latin typeface="+mj-lt"/>
-                <a:ea typeface="+mj-ea"/>
-                <a:cs typeface="+mj-cs"/>
-              </a:defRPr>
-            </a:lvl1pPr>
-          </a:lstStyle>
-          <a:p>
-            <a:pPr>
-              <a:lnSpc>
-                <a:spcPct val="100000"/>
-              </a:lnSpc>
-              <a:spcBef>
-                <a:spcPts val="0"/>
-              </a:spcBef>
-              <a:defRPr/>
-            </a:pPr>
-            <a:r>
-              <a:rPr lang="en-US" b="1" dirty="0"/>
-              <a:t>Senior</a:t>
-            </a:r>
-            <a:endParaRPr lang="en-US" dirty="0"/>
-          </a:p>
-        </p:txBody>
-      </p:sp>
       <p:grpSp>
         <p:nvGrpSpPr>
           <p:cNvPr id="34" name="Group 33">
@@ -19679,15 +19622,6 @@
 </file>
 
 <file path=customXml/item2.xml><?xml version="1.0" encoding="utf-8"?>
-<?mso-contentType ?>
-<FormTemplates xmlns="http://schemas.microsoft.com/sharepoint/v3/contenttype/forms">
-  <Display>DocumentLibraryForm</Display>
-  <Edit>DocumentLibraryForm</Edit>
-  <New>DocumentLibraryForm</New>
-</FormTemplates>
-</file>
-
-<file path=customXml/item3.xml><?xml version="1.0" encoding="utf-8"?>
 <ct:contentTypeSchema xmlns:ct="http://schemas.microsoft.com/office/2006/metadata/contentType" xmlns:ma="http://schemas.microsoft.com/office/2006/metadata/properties/metaAttributes" ct:_="" ma:_="" ma:contentTypeName="Document" ma:contentTypeID="0x01010040E5FEDB1D7E0E439D01C4778E26E1C7" ma:contentTypeVersion="25" ma:contentTypeDescription="Create a new document." ma:contentTypeScope="" ma:versionID="8acd9d3d2d62b69c61b7712291ae4a62">
   <xsd:schema xmlns:xsd="http://www.w3.org/2001/XMLSchema" xmlns:xs="http://www.w3.org/2001/XMLSchema" xmlns:p="http://schemas.microsoft.com/office/2006/metadata/properties" xmlns:ns2="52b95d8f-cf83-493a-9896-c9433cbed169" xmlns:ns3="86aa8ee5-e132-47b8-ab78-eadcf36a0d3c" targetNamespace="http://schemas.microsoft.com/office/2006/metadata/properties" ma:root="true" ma:fieldsID="c8576770e1a36ff70dc1e563d93f2089" ns2:_="" ns3:_="">
     <xsd:import namespace="52b95d8f-cf83-493a-9896-c9433cbed169"/>
@@ -20060,6 +19994,15 @@
 </ct:contentTypeSchema>
 </file>
 
+<file path=customXml/item3.xml><?xml version="1.0" encoding="utf-8"?>
+<?mso-contentType ?>
+<FormTemplates xmlns="http://schemas.microsoft.com/sharepoint/v3/contenttype/forms">
+  <Display>DocumentLibraryForm</Display>
+  <Edit>DocumentLibraryForm</Edit>
+  <New>DocumentLibraryForm</New>
+</FormTemplates>
+</file>
+
 <file path=customXml/itemProps1.xml><?xml version="1.0" encoding="utf-8"?>
 <ds:datastoreItem xmlns:ds="http://schemas.openxmlformats.org/officeDocument/2006/customXml" ds:itemID="{5626B806-0237-4942-A1FD-5C97285908C2}">
   <ds:schemaRefs>
@@ -20078,14 +20021,6 @@
 </file>
 
 <file path=customXml/itemProps2.xml><?xml version="1.0" encoding="utf-8"?>
-<ds:datastoreItem xmlns:ds="http://schemas.openxmlformats.org/officeDocument/2006/customXml" ds:itemID="{4B6B7BE2-63AD-4C37-AC44-F0E4FC348E24}">
-  <ds:schemaRefs>
-    <ds:schemaRef ds:uri="http://schemas.microsoft.com/sharepoint/v3/contenttype/forms"/>
-  </ds:schemaRefs>
-</ds:datastoreItem>
-</file>
-
-<file path=customXml/itemProps3.xml><?xml version="1.0" encoding="utf-8"?>
 <ds:datastoreItem xmlns:ds="http://schemas.openxmlformats.org/officeDocument/2006/customXml" ds:itemID="{2626516F-70C5-4118-8126-EF5C34F0415E}">
   <ds:schemaRefs>
     <ds:schemaRef ds:uri="http://schemas.microsoft.com/office/2006/metadata/contentType"/>
@@ -20102,4 +20037,12 @@
     <ds:schemaRef ds:uri="http://schemas.microsoft.com/internal/obd"/>
   </ds:schemaRefs>
 </ds:datastoreItem>
+</file>
+
+<file path=customXml/itemProps3.xml><?xml version="1.0" encoding="utf-8"?>
+<ds:datastoreItem xmlns:ds="http://schemas.openxmlformats.org/officeDocument/2006/customXml" ds:itemID="{4B6B7BE2-63AD-4C37-AC44-F0E4FC348E24}">
+  <ds:schemaRefs>
+    <ds:schemaRef ds:uri="http://schemas.microsoft.com/sharepoint/v3/contenttype/forms"/>
+  </ds:schemaRefs>
+</ds:datastoreItem>
 </file>
</xml_diff>

<commit_message>
Improved instructions, avoid misleading questions
</commit_message>
<xml_diff>
--- a/Eraneos_Analytics_DE_dropzone_challenge.pptx
+++ b/Eraneos_Analytics_DE_dropzone_challenge.pptx
@@ -215,52 +215,6 @@
             </pc226:cmChg>
           </p:ext>
         </pc:extLst>
-      </pc:sldChg>
-    </pc:docChg>
-  </pc:docChgLst>
-  <pc:docChgLst>
-    <pc:chgData name="Andrew Curran" userId="S::andrew.curran@eraneos.com::a3863812-7cd4-4576-bf46-b5bcf6048772" providerId="AD" clId="Web-{59EDA2CB-B4ED-700B-EDF6-AC957083C78C}"/>
-    <pc:docChg chg="modSld">
-      <pc:chgData name="Andrew Curran" userId="S::andrew.curran@eraneos.com::a3863812-7cd4-4576-bf46-b5bcf6048772" providerId="AD" clId="Web-{59EDA2CB-B4ED-700B-EDF6-AC957083C78C}" dt="2025-11-13T16:42:09.089" v="8" actId="20577"/>
-      <pc:docMkLst>
-        <pc:docMk/>
-      </pc:docMkLst>
-      <pc:sldChg chg="modSp">
-        <pc:chgData name="Andrew Curran" userId="S::andrew.curran@eraneos.com::a3863812-7cd4-4576-bf46-b5bcf6048772" providerId="AD" clId="Web-{59EDA2CB-B4ED-700B-EDF6-AC957083C78C}" dt="2025-11-13T16:42:09.089" v="8" actId="20577"/>
-        <pc:sldMkLst>
-          <pc:docMk/>
-          <pc:sldMk cId="1645354078" sldId="2147483638"/>
-        </pc:sldMkLst>
-        <pc:spChg chg="mod">
-          <ac:chgData name="Andrew Curran" userId="S::andrew.curran@eraneos.com::a3863812-7cd4-4576-bf46-b5bcf6048772" providerId="AD" clId="Web-{59EDA2CB-B4ED-700B-EDF6-AC957083C78C}" dt="2025-11-13T16:42:09.089" v="8" actId="20577"/>
-          <ac:spMkLst>
-            <pc:docMk/>
-            <pc:sldMk cId="1645354078" sldId="2147483638"/>
-            <ac:spMk id="2" creationId="{A2710E54-BDA1-E2C6-9DAC-6BD19C10D3FF}"/>
-          </ac:spMkLst>
-        </pc:spChg>
-      </pc:sldChg>
-      <pc:sldChg chg="mod modShow">
-        <pc:chgData name="Andrew Curran" userId="S::andrew.curran@eraneos.com::a3863812-7cd4-4576-bf46-b5bcf6048772" providerId="AD" clId="Web-{59EDA2CB-B4ED-700B-EDF6-AC957083C78C}" dt="2025-11-13T16:39:10.768" v="6"/>
-        <pc:sldMkLst>
-          <pc:docMk/>
-          <pc:sldMk cId="114453378" sldId="2147483641"/>
-        </pc:sldMkLst>
-      </pc:sldChg>
-      <pc:sldChg chg="modSp">
-        <pc:chgData name="Andrew Curran" userId="S::andrew.curran@eraneos.com::a3863812-7cd4-4576-bf46-b5bcf6048772" providerId="AD" clId="Web-{59EDA2CB-B4ED-700B-EDF6-AC957083C78C}" dt="2025-11-13T16:39:00.049" v="5" actId="20577"/>
-        <pc:sldMkLst>
-          <pc:docMk/>
-          <pc:sldMk cId="2665604951" sldId="2147483642"/>
-        </pc:sldMkLst>
-        <pc:spChg chg="mod">
-          <ac:chgData name="Andrew Curran" userId="S::andrew.curran@eraneos.com::a3863812-7cd4-4576-bf46-b5bcf6048772" providerId="AD" clId="Web-{59EDA2CB-B4ED-700B-EDF6-AC957083C78C}" dt="2025-11-13T16:39:00.049" v="5" actId="20577"/>
-          <ac:spMkLst>
-            <pc:docMk/>
-            <pc:sldMk cId="2665604951" sldId="2147483642"/>
-            <ac:spMk id="37" creationId="{D1B7D028-7BD8-31D7-6ED2-5298560D256F}"/>
-          </ac:spMkLst>
-        </pc:spChg>
       </pc:sldChg>
     </pc:docChg>
   </pc:docChgLst>
@@ -732,6 +686,52 @@
     </pc:docChg>
   </pc:docChgLst>
   <pc:docChgLst>
+    <pc:chgData name="Andrew Curran" userId="S::andrew.curran@eraneos.com::a3863812-7cd4-4576-bf46-b5bcf6048772" providerId="AD" clId="Web-{59EDA2CB-B4ED-700B-EDF6-AC957083C78C}"/>
+    <pc:docChg chg="modSld">
+      <pc:chgData name="Andrew Curran" userId="S::andrew.curran@eraneos.com::a3863812-7cd4-4576-bf46-b5bcf6048772" providerId="AD" clId="Web-{59EDA2CB-B4ED-700B-EDF6-AC957083C78C}" dt="2025-11-13T16:42:09.089" v="8" actId="20577"/>
+      <pc:docMkLst>
+        <pc:docMk/>
+      </pc:docMkLst>
+      <pc:sldChg chg="modSp">
+        <pc:chgData name="Andrew Curran" userId="S::andrew.curran@eraneos.com::a3863812-7cd4-4576-bf46-b5bcf6048772" providerId="AD" clId="Web-{59EDA2CB-B4ED-700B-EDF6-AC957083C78C}" dt="2025-11-13T16:42:09.089" v="8" actId="20577"/>
+        <pc:sldMkLst>
+          <pc:docMk/>
+          <pc:sldMk cId="1645354078" sldId="2147483638"/>
+        </pc:sldMkLst>
+        <pc:spChg chg="mod">
+          <ac:chgData name="Andrew Curran" userId="S::andrew.curran@eraneos.com::a3863812-7cd4-4576-bf46-b5bcf6048772" providerId="AD" clId="Web-{59EDA2CB-B4ED-700B-EDF6-AC957083C78C}" dt="2025-11-13T16:42:09.089" v="8" actId="20577"/>
+          <ac:spMkLst>
+            <pc:docMk/>
+            <pc:sldMk cId="1645354078" sldId="2147483638"/>
+            <ac:spMk id="2" creationId="{A2710E54-BDA1-E2C6-9DAC-6BD19C10D3FF}"/>
+          </ac:spMkLst>
+        </pc:spChg>
+      </pc:sldChg>
+      <pc:sldChg chg="mod modShow">
+        <pc:chgData name="Andrew Curran" userId="S::andrew.curran@eraneos.com::a3863812-7cd4-4576-bf46-b5bcf6048772" providerId="AD" clId="Web-{59EDA2CB-B4ED-700B-EDF6-AC957083C78C}" dt="2025-11-13T16:39:10.768" v="6"/>
+        <pc:sldMkLst>
+          <pc:docMk/>
+          <pc:sldMk cId="114453378" sldId="2147483641"/>
+        </pc:sldMkLst>
+      </pc:sldChg>
+      <pc:sldChg chg="modSp">
+        <pc:chgData name="Andrew Curran" userId="S::andrew.curran@eraneos.com::a3863812-7cd4-4576-bf46-b5bcf6048772" providerId="AD" clId="Web-{59EDA2CB-B4ED-700B-EDF6-AC957083C78C}" dt="2025-11-13T16:39:00.049" v="5" actId="20577"/>
+        <pc:sldMkLst>
+          <pc:docMk/>
+          <pc:sldMk cId="2665604951" sldId="2147483642"/>
+        </pc:sldMkLst>
+        <pc:spChg chg="mod">
+          <ac:chgData name="Andrew Curran" userId="S::andrew.curran@eraneos.com::a3863812-7cd4-4576-bf46-b5bcf6048772" providerId="AD" clId="Web-{59EDA2CB-B4ED-700B-EDF6-AC957083C78C}" dt="2025-11-13T16:39:00.049" v="5" actId="20577"/>
+          <ac:spMkLst>
+            <pc:docMk/>
+            <pc:sldMk cId="2665604951" sldId="2147483642"/>
+            <ac:spMk id="37" creationId="{D1B7D028-7BD8-31D7-6ED2-5298560D256F}"/>
+          </ac:spMkLst>
+        </pc:spChg>
+      </pc:sldChg>
+    </pc:docChg>
+  </pc:docChgLst>
+  <pc:docChgLst>
     <pc:chgData name="Andrew Curran" userId="S::andrew.curran@eraneos.com::a3863812-7cd4-4576-bf46-b5bcf6048772" providerId="AD" clId="Web-{4EF48214-E955-49D6-F60D-5B2393C42EF7}"/>
     <pc:docChg chg="modSld">
       <pc:chgData name="Andrew Curran" userId="S::andrew.curran@eraneos.com::a3863812-7cd4-4576-bf46-b5bcf6048772" providerId="AD" clId="Web-{4EF48214-E955-49D6-F60D-5B2393C42EF7}" dt="2025-10-28T08:13:33.412" v="195" actId="20577"/>
@@ -1169,7 +1169,7 @@
           <a:p>
             <a:fld id="{EEC665CA-D682-48EC-95D2-126FD6449D65}" type="datetime1">
               <a:rPr lang="de-CH" sz="900" smtClean="0"/>
-              <a:t>05.01.26</a:t>
+              <a:t>18.01.26</a:t>
             </a:fld>
             <a:endParaRPr lang="de-CH" sz="900"/>
           </a:p>
@@ -1470,7 +1470,7 @@
           <a:p>
             <a:fld id="{A17AAF7D-4283-4014-80F4-26E915FEACF8}" type="datetime1">
               <a:rPr lang="de-CH" smtClean="0"/>
-              <a:t>05.01.26</a:t>
+              <a:t>18.01.26</a:t>
             </a:fld>
             <a:endParaRPr lang="de-CH"/>
           </a:p>
@@ -13724,7 +13724,7 @@
             </a:pPr>
             <a:r>
               <a:rPr lang="en-US" sz="1000" dirty="0"/>
-              <a:t>We expect the solution to be designed to run on either AWS or Googe Cloud.</a:t>
+              <a:t>We expect the solution to be effectively deployed on AWS or Googe Cloud.</a:t>
             </a:r>
             <a:endParaRPr lang="en-US" sz="1000" dirty="0">
               <a:cs typeface="Arial"/>
@@ -13742,7 +13742,7 @@
             </a:br>
             <a:r>
               <a:rPr lang="en-US" sz="1000" dirty="0"/>
-              <a:t>Feel free to use any coding language and technology that you feel is the most appropriate for the task and you feel comfortable with. </a:t>
+              <a:t>Feel free to use any coding language and technology that you feel is the most appropriate for the task and you feel comfortable with.</a:t>
             </a:r>
           </a:p>
           <a:p>
@@ -13784,7 +13784,7 @@
             </a:pPr>
             <a:r>
               <a:rPr lang="en-US" sz="1000" dirty="0"/>
-              <a:t>Feel free to use GenAI to assist you in your data case. We expect however an open and honest discussion about how it fits into your workflow, and for you to take ownership of everything in your final solution</a:t>
+              <a:t>Feel free to use GenAI coding assistants to create and improve your architecture and pipelines. We are looking forward to an open discussion what you used and how it improved your efficiency.</a:t>
             </a:r>
           </a:p>
         </p:txBody>
@@ -15150,7 +15150,7 @@
             <a:p>
               <a:r>
                 <a:rPr lang="en-US" sz="1100" dirty="0"/>
-                <a:t>The data should also be enriched with the static reference data. Ensure that data quality checks are performed and handle failures appropriately.</a:t>
+                <a:t>Please ensure that data quality checks are performed and handle failures appropriately.</a:t>
               </a:r>
               <a:endParaRPr lang="en-US" sz="1100" noProof="0" dirty="0">
                 <a:solidFill>
@@ -16015,7 +16015,7 @@
                   <a:uLnTx/>
                   <a:uFillTx/>
                 </a:rPr>
-                <a:t>00 | Lineage and Governance</a:t>
+                <a:t>00 | (Optional) Lineage and Governance</a:t>
               </a:r>
               <a:endParaRPr kumimoji="0" lang="en-US" sz="1050" b="1" i="0" u="none" strike="noStrike" kern="1200" cap="none" spc="0" normalizeH="0" baseline="0" noProof="0" dirty="0">
                 <a:ln>
@@ -16106,18 +16106,13 @@
             <a:lstStyle/>
             <a:p>
               <a:r>
-                <a:rPr lang="en-US" sz="1100" noProof="0" dirty="0"/>
-                <a:t>Each reference dataset should comply to a sensible data contract/schema. Design a metadata table to track lineage. How would you automate the addition of further reference datasets?</a:t>
+                <a:rPr lang="en-US" sz="1100" dirty="0"/>
+                <a:t>Reason about data </a:t>
               </a:r>
               <a:r>
-                <a:rPr lang="en-US" sz="1100" dirty="0"/>
-                <a:t> What about a data catalog?</a:t>
+                <a:rPr lang="en-US" sz="1100" noProof="0" dirty="0"/>
+                <a:t>contracts and tracking lineage. If time allows, introduce components that allow you to implement these mechanisms.</a:t>
               </a:r>
-              <a:endParaRPr lang="en-US" sz="1100" noProof="0" dirty="0"/>
-            </a:p>
-            <a:p>
-              <a:pPr algn="l"/>
-              <a:endParaRPr lang="en-US" sz="1300" noProof="0" dirty="0"/>
             </a:p>
           </p:txBody>
         </p:sp>
@@ -19575,53 +19570,6 @@
 </file>
 
 <file path=customXml/item1.xml><?xml version="1.0" encoding="utf-8"?>
-<p:properties xmlns:p="http://schemas.microsoft.com/office/2006/metadata/properties" xmlns:xsi="http://www.w3.org/2001/XMLSchema-instance" xmlns:pc="http://schemas.microsoft.com/office/infopath/2007/PartnerControls">
-  <documentManagement>
-    <SharedWithUsers xmlns="86aa8ee5-e132-47b8-ab78-eadcf36a0d3c">
-      <UserInfo>
-        <DisplayName>Jan Laudi</DisplayName>
-        <AccountId>12</AccountId>
-        <AccountType/>
-      </UserInfo>
-      <UserInfo>
-        <DisplayName>Florian Stumpf</DisplayName>
-        <AccountId>13</AccountId>
-        <AccountType/>
-      </UserInfo>
-      <UserInfo>
-        <DisplayName>Martin Schade</DisplayName>
-        <AccountId>43</AccountId>
-        <AccountType/>
-      </UserInfo>
-    </SharedWithUsers>
-    <ProjectType xmlns="52b95d8f-cf83-493a-9896-c9433cbed169" xsi:nil="true"/>
-    <lcf76f155ced4ddcb4097134ff3c332f xmlns="52b95d8f-cf83-493a-9896-c9433cbed169">
-      <Terms xmlns="http://schemas.microsoft.com/office/infopath/2007/PartnerControls"/>
-    </lcf76f155ced4ddcb4097134ff3c332f>
-    <Responsibility xmlns="52b95d8f-cf83-493a-9896-c9433cbed169">
-      <UserInfo>
-        <DisplayName/>
-        <AccountId xsi:nil="true"/>
-        <AccountType/>
-      </UserInfo>
-    </Responsibility>
-    <Consultant xmlns="52b95d8f-cf83-493a-9896-c9433cbed169">
-      <UserInfo>
-        <DisplayName/>
-        <AccountId xsi:nil="true"/>
-        <AccountType/>
-      </UserInfo>
-    </Consultant>
-    <Teamslideenabled xmlns="52b95d8f-cf83-493a-9896-c9433cbed169" xsi:nil="true"/>
-    <Industry xmlns="52b95d8f-cf83-493a-9896-c9433cbed169" xsi:nil="true"/>
-    <ShortDescription xmlns="52b95d8f-cf83-493a-9896-c9433cbed169" xsi:nil="true"/>
-    <TaxCatchAll xmlns="86aa8ee5-e132-47b8-ab78-eadcf36a0d3c" xsi:nil="true"/>
-    <Language xmlns="52b95d8f-cf83-493a-9896-c9433cbed169" xsi:nil="true"/>
-  </documentManagement>
-</p:properties>
-</file>
-
-<file path=customXml/item2.xml><?xml version="1.0" encoding="utf-8"?>
 <ct:contentTypeSchema xmlns:ct="http://schemas.microsoft.com/office/2006/metadata/contentType" xmlns:ma="http://schemas.microsoft.com/office/2006/metadata/properties/metaAttributes" ct:_="" ma:_="" ma:contentTypeName="Document" ma:contentTypeID="0x01010040E5FEDB1D7E0E439D01C4778E26E1C7" ma:contentTypeVersion="25" ma:contentTypeDescription="Create a new document." ma:contentTypeScope="" ma:versionID="8acd9d3d2d62b69c61b7712291ae4a62">
   <xsd:schema xmlns:xsd="http://www.w3.org/2001/XMLSchema" xmlns:xs="http://www.w3.org/2001/XMLSchema" xmlns:p="http://schemas.microsoft.com/office/2006/metadata/properties" xmlns:ns2="52b95d8f-cf83-493a-9896-c9433cbed169" xmlns:ns3="86aa8ee5-e132-47b8-ab78-eadcf36a0d3c" targetNamespace="http://schemas.microsoft.com/office/2006/metadata/properties" ma:root="true" ma:fieldsID="c8576770e1a36ff70dc1e563d93f2089" ns2:_="" ns3:_="">
     <xsd:import namespace="52b95d8f-cf83-493a-9896-c9433cbed169"/>
@@ -19994,6 +19942,53 @@
 </ct:contentTypeSchema>
 </file>
 
+<file path=customXml/item2.xml><?xml version="1.0" encoding="utf-8"?>
+<p:properties xmlns:p="http://schemas.microsoft.com/office/2006/metadata/properties" xmlns:xsi="http://www.w3.org/2001/XMLSchema-instance" xmlns:pc="http://schemas.microsoft.com/office/infopath/2007/PartnerControls">
+  <documentManagement>
+    <SharedWithUsers xmlns="86aa8ee5-e132-47b8-ab78-eadcf36a0d3c">
+      <UserInfo>
+        <DisplayName>Jan Laudi</DisplayName>
+        <AccountId>12</AccountId>
+        <AccountType/>
+      </UserInfo>
+      <UserInfo>
+        <DisplayName>Florian Stumpf</DisplayName>
+        <AccountId>13</AccountId>
+        <AccountType/>
+      </UserInfo>
+      <UserInfo>
+        <DisplayName>Martin Schade</DisplayName>
+        <AccountId>43</AccountId>
+        <AccountType/>
+      </UserInfo>
+    </SharedWithUsers>
+    <ProjectType xmlns="52b95d8f-cf83-493a-9896-c9433cbed169" xsi:nil="true"/>
+    <lcf76f155ced4ddcb4097134ff3c332f xmlns="52b95d8f-cf83-493a-9896-c9433cbed169">
+      <Terms xmlns="http://schemas.microsoft.com/office/infopath/2007/PartnerControls"/>
+    </lcf76f155ced4ddcb4097134ff3c332f>
+    <Responsibility xmlns="52b95d8f-cf83-493a-9896-c9433cbed169">
+      <UserInfo>
+        <DisplayName/>
+        <AccountId xsi:nil="true"/>
+        <AccountType/>
+      </UserInfo>
+    </Responsibility>
+    <Consultant xmlns="52b95d8f-cf83-493a-9896-c9433cbed169">
+      <UserInfo>
+        <DisplayName/>
+        <AccountId xsi:nil="true"/>
+        <AccountType/>
+      </UserInfo>
+    </Consultant>
+    <Teamslideenabled xmlns="52b95d8f-cf83-493a-9896-c9433cbed169" xsi:nil="true"/>
+    <Industry xmlns="52b95d8f-cf83-493a-9896-c9433cbed169" xsi:nil="true"/>
+    <ShortDescription xmlns="52b95d8f-cf83-493a-9896-c9433cbed169" xsi:nil="true"/>
+    <TaxCatchAll xmlns="86aa8ee5-e132-47b8-ab78-eadcf36a0d3c" xsi:nil="true"/>
+    <Language xmlns="52b95d8f-cf83-493a-9896-c9433cbed169" xsi:nil="true"/>
+  </documentManagement>
+</p:properties>
+</file>
+
 <file path=customXml/item3.xml><?xml version="1.0" encoding="utf-8"?>
 <?mso-contentType ?>
 <FormTemplates xmlns="http://schemas.microsoft.com/sharepoint/v3/contenttype/forms">
@@ -20004,23 +19999,6 @@
 </file>
 
 <file path=customXml/itemProps1.xml><?xml version="1.0" encoding="utf-8"?>
-<ds:datastoreItem xmlns:ds="http://schemas.openxmlformats.org/officeDocument/2006/customXml" ds:itemID="{5626B806-0237-4942-A1FD-5C97285908C2}">
-  <ds:schemaRefs>
-    <ds:schemaRef ds:uri="http://purl.org/dc/dcmitype/"/>
-    <ds:schemaRef ds:uri="http://www.w3.org/XML/1998/namespace"/>
-    <ds:schemaRef ds:uri="86aa8ee5-e132-47b8-ab78-eadcf36a0d3c"/>
-    <ds:schemaRef ds:uri="http://purl.org/dc/elements/1.1/"/>
-    <ds:schemaRef ds:uri="http://schemas.openxmlformats.org/package/2006/metadata/core-properties"/>
-    <ds:schemaRef ds:uri="http://schemas.microsoft.com/office/2006/metadata/properties"/>
-    <ds:schemaRef ds:uri="http://schemas.microsoft.com/office/2006/documentManagement/types"/>
-    <ds:schemaRef ds:uri="http://schemas.microsoft.com/office/infopath/2007/PartnerControls"/>
-    <ds:schemaRef ds:uri="52b95d8f-cf83-493a-9896-c9433cbed169"/>
-    <ds:schemaRef ds:uri="http://purl.org/dc/terms/"/>
-  </ds:schemaRefs>
-</ds:datastoreItem>
-</file>
-
-<file path=customXml/itemProps2.xml><?xml version="1.0" encoding="utf-8"?>
 <ds:datastoreItem xmlns:ds="http://schemas.openxmlformats.org/officeDocument/2006/customXml" ds:itemID="{2626516F-70C5-4118-8126-EF5C34F0415E}">
   <ds:schemaRefs>
     <ds:schemaRef ds:uri="http://schemas.microsoft.com/office/2006/metadata/contentType"/>
@@ -20039,6 +20017,23 @@
 </ds:datastoreItem>
 </file>
 
+<file path=customXml/itemProps2.xml><?xml version="1.0" encoding="utf-8"?>
+<ds:datastoreItem xmlns:ds="http://schemas.openxmlformats.org/officeDocument/2006/customXml" ds:itemID="{5626B806-0237-4942-A1FD-5C97285908C2}">
+  <ds:schemaRefs>
+    <ds:schemaRef ds:uri="http://purl.org/dc/dcmitype/"/>
+    <ds:schemaRef ds:uri="http://www.w3.org/XML/1998/namespace"/>
+    <ds:schemaRef ds:uri="86aa8ee5-e132-47b8-ab78-eadcf36a0d3c"/>
+    <ds:schemaRef ds:uri="http://purl.org/dc/elements/1.1/"/>
+    <ds:schemaRef ds:uri="http://schemas.openxmlformats.org/package/2006/metadata/core-properties"/>
+    <ds:schemaRef ds:uri="http://schemas.microsoft.com/office/2006/metadata/properties"/>
+    <ds:schemaRef ds:uri="http://schemas.microsoft.com/office/2006/documentManagement/types"/>
+    <ds:schemaRef ds:uri="http://schemas.microsoft.com/office/infopath/2007/PartnerControls"/>
+    <ds:schemaRef ds:uri="52b95d8f-cf83-493a-9896-c9433cbed169"/>
+    <ds:schemaRef ds:uri="http://purl.org/dc/terms/"/>
+  </ds:schemaRefs>
+</ds:datastoreItem>
+</file>
+
 <file path=customXml/itemProps3.xml><?xml version="1.0" encoding="utf-8"?>
 <ds:datastoreItem xmlns:ds="http://schemas.openxmlformats.org/officeDocument/2006/customXml" ds:itemID="{4B6B7BE2-63AD-4C37-AC44-F0E4FC348E24}">
   <ds:schemaRefs>

</xml_diff>